<commit_message>
Deployed 326098b with MkDocs version: 0.16.1
</commit_message>
<xml_diff>
--- a/chapter7/img/media-plan.pptx
+++ b/chapter7/img/media-plan.pptx
@@ -241,7 +241,7 @@
           <a:p>
             <a:fld id="{E62C12F6-0F3B-49A7-B4F5-A826FDFE76D6}" type="datetimeFigureOut">
               <a:rPr lang="en-US" smtClean="0"/>
-              <a:t>2/8/2017</a:t>
+              <a:t>3/21/2017</a:t>
             </a:fld>
             <a:endParaRPr lang="en-US"/>
           </a:p>
@@ -409,7 +409,7 @@
           <a:p>
             <a:fld id="{E62C12F6-0F3B-49A7-B4F5-A826FDFE76D6}" type="datetimeFigureOut">
               <a:rPr lang="en-US" smtClean="0"/>
-              <a:t>2/8/2017</a:t>
+              <a:t>3/21/2017</a:t>
             </a:fld>
             <a:endParaRPr lang="en-US"/>
           </a:p>
@@ -587,7 +587,7 @@
           <a:p>
             <a:fld id="{E62C12F6-0F3B-49A7-B4F5-A826FDFE76D6}" type="datetimeFigureOut">
               <a:rPr lang="en-US" smtClean="0"/>
-              <a:t>2/8/2017</a:t>
+              <a:t>3/21/2017</a:t>
             </a:fld>
             <a:endParaRPr lang="en-US"/>
           </a:p>
@@ -755,7 +755,7 @@
           <a:p>
             <a:fld id="{E62C12F6-0F3B-49A7-B4F5-A826FDFE76D6}" type="datetimeFigureOut">
               <a:rPr lang="en-US" smtClean="0"/>
-              <a:t>2/8/2017</a:t>
+              <a:t>3/21/2017</a:t>
             </a:fld>
             <a:endParaRPr lang="en-US"/>
           </a:p>
@@ -1000,7 +1000,7 @@
           <a:p>
             <a:fld id="{E62C12F6-0F3B-49A7-B4F5-A826FDFE76D6}" type="datetimeFigureOut">
               <a:rPr lang="en-US" smtClean="0"/>
-              <a:t>2/8/2017</a:t>
+              <a:t>3/21/2017</a:t>
             </a:fld>
             <a:endParaRPr lang="en-US"/>
           </a:p>
@@ -1229,7 +1229,7 @@
           <a:p>
             <a:fld id="{E62C12F6-0F3B-49A7-B4F5-A826FDFE76D6}" type="datetimeFigureOut">
               <a:rPr lang="en-US" smtClean="0"/>
-              <a:t>2/8/2017</a:t>
+              <a:t>3/21/2017</a:t>
             </a:fld>
             <a:endParaRPr lang="en-US"/>
           </a:p>
@@ -1593,7 +1593,7 @@
           <a:p>
             <a:fld id="{E62C12F6-0F3B-49A7-B4F5-A826FDFE76D6}" type="datetimeFigureOut">
               <a:rPr lang="en-US" smtClean="0"/>
-              <a:t>2/8/2017</a:t>
+              <a:t>3/21/2017</a:t>
             </a:fld>
             <a:endParaRPr lang="en-US"/>
           </a:p>
@@ -1710,7 +1710,7 @@
           <a:p>
             <a:fld id="{E62C12F6-0F3B-49A7-B4F5-A826FDFE76D6}" type="datetimeFigureOut">
               <a:rPr lang="en-US" smtClean="0"/>
-              <a:t>2/8/2017</a:t>
+              <a:t>3/21/2017</a:t>
             </a:fld>
             <a:endParaRPr lang="en-US"/>
           </a:p>
@@ -1805,7 +1805,7 @@
           <a:p>
             <a:fld id="{E62C12F6-0F3B-49A7-B4F5-A826FDFE76D6}" type="datetimeFigureOut">
               <a:rPr lang="en-US" smtClean="0"/>
-              <a:t>2/8/2017</a:t>
+              <a:t>3/21/2017</a:t>
             </a:fld>
             <a:endParaRPr lang="en-US"/>
           </a:p>
@@ -2080,7 +2080,7 @@
           <a:p>
             <a:fld id="{E62C12F6-0F3B-49A7-B4F5-A826FDFE76D6}" type="datetimeFigureOut">
               <a:rPr lang="en-US" smtClean="0"/>
-              <a:t>2/8/2017</a:t>
+              <a:t>3/21/2017</a:t>
             </a:fld>
             <a:endParaRPr lang="en-US"/>
           </a:p>
@@ -2332,7 +2332,7 @@
           <a:p>
             <a:fld id="{E62C12F6-0F3B-49A7-B4F5-A826FDFE76D6}" type="datetimeFigureOut">
               <a:rPr lang="en-US" smtClean="0"/>
-              <a:t>2/8/2017</a:t>
+              <a:t>3/21/2017</a:t>
             </a:fld>
             <a:endParaRPr lang="en-US"/>
           </a:p>
@@ -2543,7 +2543,7 @@
           <a:p>
             <a:fld id="{E62C12F6-0F3B-49A7-B4F5-A826FDFE76D6}" type="datetimeFigureOut">
               <a:rPr lang="en-US" smtClean="0"/>
-              <a:t>2/8/2017</a:t>
+              <a:t>3/21/2017</a:t>
             </a:fld>
             <a:endParaRPr lang="en-US"/>
           </a:p>
@@ -3342,46 +3342,9 @@
           </a:p>
         </p:txBody>
       </p:sp>
-      <p:cxnSp>
-        <p:nvCxnSpPr>
-          <p:cNvPr id="37" name="Straight Arrow Connector 36"/>
-          <p:cNvCxnSpPr>
-            <a:cxnSpLocks/>
-            <a:stCxn id="5" idx="3"/>
-            <a:endCxn id="44" idx="1"/>
-          </p:cNvCxnSpPr>
-          <p:nvPr/>
-        </p:nvCxnSpPr>
-        <p:spPr>
-          <a:xfrm flipV="1">
-            <a:off x="5613787" y="2123832"/>
-            <a:ext cx="2694560" cy="1"/>
-          </a:xfrm>
-          <a:prstGeom prst="straightConnector1">
-            <a:avLst/>
-          </a:prstGeom>
-          <a:ln>
-            <a:tailEnd type="triangle"/>
-          </a:ln>
-        </p:spPr>
-        <p:style>
-          <a:lnRef idx="1">
-            <a:schemeClr val="accent1"/>
-          </a:lnRef>
-          <a:fillRef idx="0">
-            <a:schemeClr val="accent1"/>
-          </a:fillRef>
-          <a:effectRef idx="0">
-            <a:schemeClr val="accent1"/>
-          </a:effectRef>
-          <a:fontRef idx="minor">
-            <a:schemeClr val="tx1"/>
-          </a:fontRef>
-        </p:style>
-      </p:cxnSp>
       <p:pic>
         <p:nvPicPr>
-          <p:cNvPr id="44" name="Picture 43"/>
+          <p:cNvPr id="51" name="Picture 50"/>
           <p:cNvPicPr>
             <a:picLocks noChangeAspect="1"/>
           </p:cNvPicPr>
@@ -3401,8 +3364,8 @@
         </p:blipFill>
         <p:spPr>
           <a:xfrm>
-            <a:off x="8308347" y="1733687"/>
-            <a:ext cx="780290" cy="780290"/>
+            <a:off x="8232401" y="3212481"/>
+            <a:ext cx="932181" cy="934190"/>
           </a:xfrm>
           <a:prstGeom prst="rect">
             <a:avLst/>
@@ -3411,14 +3374,14 @@
       </p:pic>
       <p:pic>
         <p:nvPicPr>
-          <p:cNvPr id="51" name="Picture 50"/>
+          <p:cNvPr id="52" name="Picture 51"/>
           <p:cNvPicPr>
             <a:picLocks noChangeAspect="1"/>
           </p:cNvPicPr>
           <p:nvPr/>
         </p:nvPicPr>
         <p:blipFill>
-          <a:blip r:embed="rId9">
+          <a:blip r:embed="rId8">
             <a:extLst>
               <a:ext uri="{28A0092B-C50C-407E-A947-70E740481C1C}">
                 <a14:useLocalDpi xmlns:a14="http://schemas.microsoft.com/office/drawing/2010/main" val="0"/>
@@ -3431,7 +3394,7 @@
         </p:blipFill>
         <p:spPr>
           <a:xfrm>
-            <a:off x="8232401" y="3212481"/>
+            <a:off x="8232401" y="4386389"/>
             <a:ext cx="932181" cy="934190"/>
           </a:xfrm>
           <a:prstGeom prst="rect">
@@ -3441,14 +3404,14 @@
       </p:pic>
       <p:pic>
         <p:nvPicPr>
-          <p:cNvPr id="52" name="Picture 51"/>
+          <p:cNvPr id="53" name="Picture 52"/>
           <p:cNvPicPr>
             <a:picLocks noChangeAspect="1"/>
           </p:cNvPicPr>
           <p:nvPr/>
         </p:nvPicPr>
         <p:blipFill>
-          <a:blip r:embed="rId9">
+          <a:blip r:embed="rId8">
             <a:extLst>
               <a:ext uri="{28A0092B-C50C-407E-A947-70E740481C1C}">
                 <a14:useLocalDpi xmlns:a14="http://schemas.microsoft.com/office/drawing/2010/main" val="0"/>
@@ -3461,7 +3424,7 @@
         </p:blipFill>
         <p:spPr>
           <a:xfrm>
-            <a:off x="8232401" y="4386389"/>
+            <a:off x="8232401" y="5550523"/>
             <a:ext cx="932181" cy="934190"/>
           </a:xfrm>
           <a:prstGeom prst="rect">
@@ -3469,72 +3432,6 @@
           </a:prstGeom>
         </p:spPr>
       </p:pic>
-      <p:pic>
-        <p:nvPicPr>
-          <p:cNvPr id="53" name="Picture 52"/>
-          <p:cNvPicPr>
-            <a:picLocks noChangeAspect="1"/>
-          </p:cNvPicPr>
-          <p:nvPr/>
-        </p:nvPicPr>
-        <p:blipFill>
-          <a:blip r:embed="rId9">
-            <a:extLst>
-              <a:ext uri="{28A0092B-C50C-407E-A947-70E740481C1C}">
-                <a14:useLocalDpi xmlns:a14="http://schemas.microsoft.com/office/drawing/2010/main" val="0"/>
-              </a:ext>
-            </a:extLst>
-          </a:blip>
-          <a:stretch>
-            <a:fillRect/>
-          </a:stretch>
-        </p:blipFill>
-        <p:spPr>
-          <a:xfrm>
-            <a:off x="8232401" y="5550523"/>
-            <a:ext cx="932181" cy="934190"/>
-          </a:xfrm>
-          <a:prstGeom prst="rect">
-            <a:avLst/>
-          </a:prstGeom>
-        </p:spPr>
-      </p:pic>
-      <p:cxnSp>
-        <p:nvCxnSpPr>
-          <p:cNvPr id="55" name="Straight Arrow Connector 54"/>
-          <p:cNvCxnSpPr>
-            <a:stCxn id="44" idx="2"/>
-            <a:endCxn id="51" idx="0"/>
-          </p:cNvCxnSpPr>
-          <p:nvPr/>
-        </p:nvCxnSpPr>
-        <p:spPr>
-          <a:xfrm>
-            <a:off x="8698492" y="2513977"/>
-            <a:ext cx="0" cy="698504"/>
-          </a:xfrm>
-          <a:prstGeom prst="straightConnector1">
-            <a:avLst/>
-          </a:prstGeom>
-          <a:ln>
-            <a:tailEnd type="triangle"/>
-          </a:ln>
-        </p:spPr>
-        <p:style>
-          <a:lnRef idx="1">
-            <a:schemeClr val="accent1"/>
-          </a:lnRef>
-          <a:fillRef idx="0">
-            <a:schemeClr val="accent1"/>
-          </a:fillRef>
-          <a:effectRef idx="0">
-            <a:schemeClr val="accent1"/>
-          </a:effectRef>
-          <a:fontRef idx="minor">
-            <a:schemeClr val="tx1"/>
-          </a:fontRef>
-        </p:style>
-      </p:cxnSp>
       <p:cxnSp>
         <p:nvCxnSpPr>
           <p:cNvPr id="58" name="Straight Arrow Connector 57"/>
@@ -3609,41 +3506,6 @@
       </p:cxnSp>
       <p:sp>
         <p:nvSpPr>
-          <p:cNvPr id="61" name="TextBox 60"/>
-          <p:cNvSpPr txBox="1"/>
-          <p:nvPr/>
-        </p:nvSpPr>
-        <p:spPr>
-          <a:xfrm>
-            <a:off x="9164581" y="1867646"/>
-            <a:ext cx="2089355" cy="646331"/>
-          </a:xfrm>
-          <a:prstGeom prst="rect">
-            <a:avLst/>
-          </a:prstGeom>
-          <a:noFill/>
-        </p:spPr>
-        <p:txBody>
-          <a:bodyPr wrap="none" rtlCol="0">
-            <a:spAutoFit/>
-          </a:bodyPr>
-          <a:lstStyle/>
-          <a:p>
-            <a:r>
-              <a:rPr lang="en-US" dirty="0"/>
-              <a:t>Logic App does the</a:t>
-            </a:r>
-          </a:p>
-          <a:p>
-            <a:r>
-              <a:rPr lang="en-US" dirty="0"/>
-              <a:t>Serialization of tasks</a:t>
-            </a:r>
-          </a:p>
-        </p:txBody>
-      </p:sp>
-      <p:sp>
-        <p:nvSpPr>
           <p:cNvPr id="62" name="TextBox 61"/>
           <p:cNvSpPr txBox="1"/>
           <p:nvPr/>
@@ -3899,6 +3761,42 @@
           </a:p>
         </p:txBody>
       </p:sp>
+      <p:cxnSp>
+        <p:nvCxnSpPr>
+          <p:cNvPr id="4" name="Connector: Elbow 3"/>
+          <p:cNvCxnSpPr>
+            <a:stCxn id="5" idx="3"/>
+            <a:endCxn id="51" idx="0"/>
+          </p:cNvCxnSpPr>
+          <p:nvPr/>
+        </p:nvCxnSpPr>
+        <p:spPr>
+          <a:xfrm>
+            <a:off x="5613787" y="2123833"/>
+            <a:ext cx="3084705" cy="1088648"/>
+          </a:xfrm>
+          <a:prstGeom prst="bentConnector2">
+            <a:avLst/>
+          </a:prstGeom>
+          <a:ln>
+            <a:tailEnd type="triangle"/>
+          </a:ln>
+        </p:spPr>
+        <p:style>
+          <a:lnRef idx="1">
+            <a:schemeClr val="accent1"/>
+          </a:lnRef>
+          <a:fillRef idx="0">
+            <a:schemeClr val="accent1"/>
+          </a:fillRef>
+          <a:effectRef idx="0">
+            <a:schemeClr val="accent1"/>
+          </a:effectRef>
+          <a:fontRef idx="minor">
+            <a:schemeClr val="tx1"/>
+          </a:fontRef>
+        </p:style>
+      </p:cxnSp>
     </p:spTree>
     <p:extLst>
       <p:ext uri="{BB962C8B-B14F-4D97-AF65-F5344CB8AC3E}">

</xml_diff>